<commit_message>
poster pdf and shenanigans
</commit_message>
<xml_diff>
--- a/Graphics/Flow.pptx
+++ b/Graphics/Flow.pptx
@@ -270,7 +270,7 @@
           <a:p>
             <a:fld id="{67DA7FF3-27C9-B246-82E9-604608D4AEBB}" type="datetimeFigureOut">
               <a:rPr lang="de-DE" smtClean="0"/>
-              <a:t>14.04.19</a:t>
+              <a:t>15.04.19</a:t>
             </a:fld>
             <a:endParaRPr lang="de-DE"/>
           </a:p>
@@ -324,7 +324,7 @@
           <a:p>
             <a:fld id="{D7FD97AA-C347-C94D-B619-816BCDA6CB60}" type="slidenum">
               <a:rPr lang="de-DE" smtClean="0"/>
-              <a:t>‹Nr.›</a:t>
+              <a:t>‹#›</a:t>
             </a:fld>
             <a:endParaRPr lang="de-DE"/>
           </a:p>
@@ -468,7 +468,7 @@
           <a:p>
             <a:fld id="{67DA7FF3-27C9-B246-82E9-604608D4AEBB}" type="datetimeFigureOut">
               <a:rPr lang="de-DE" smtClean="0"/>
-              <a:t>14.04.19</a:t>
+              <a:t>15.04.19</a:t>
             </a:fld>
             <a:endParaRPr lang="de-DE"/>
           </a:p>
@@ -522,7 +522,7 @@
           <a:p>
             <a:fld id="{D7FD97AA-C347-C94D-B619-816BCDA6CB60}" type="slidenum">
               <a:rPr lang="de-DE" smtClean="0"/>
-              <a:t>‹Nr.›</a:t>
+              <a:t>‹#›</a:t>
             </a:fld>
             <a:endParaRPr lang="de-DE"/>
           </a:p>
@@ -676,7 +676,7 @@
           <a:p>
             <a:fld id="{67DA7FF3-27C9-B246-82E9-604608D4AEBB}" type="datetimeFigureOut">
               <a:rPr lang="de-DE" smtClean="0"/>
-              <a:t>14.04.19</a:t>
+              <a:t>15.04.19</a:t>
             </a:fld>
             <a:endParaRPr lang="de-DE"/>
           </a:p>
@@ -730,7 +730,7 @@
           <a:p>
             <a:fld id="{D7FD97AA-C347-C94D-B619-816BCDA6CB60}" type="slidenum">
               <a:rPr lang="de-DE" smtClean="0"/>
-              <a:t>‹Nr.›</a:t>
+              <a:t>‹#›</a:t>
             </a:fld>
             <a:endParaRPr lang="de-DE"/>
           </a:p>
@@ -874,7 +874,7 @@
           <a:p>
             <a:fld id="{67DA7FF3-27C9-B246-82E9-604608D4AEBB}" type="datetimeFigureOut">
               <a:rPr lang="de-DE" smtClean="0"/>
-              <a:t>14.04.19</a:t>
+              <a:t>15.04.19</a:t>
             </a:fld>
             <a:endParaRPr lang="de-DE"/>
           </a:p>
@@ -928,7 +928,7 @@
           <a:p>
             <a:fld id="{D7FD97AA-C347-C94D-B619-816BCDA6CB60}" type="slidenum">
               <a:rPr lang="de-DE" smtClean="0"/>
-              <a:t>‹Nr.›</a:t>
+              <a:t>‹#›</a:t>
             </a:fld>
             <a:endParaRPr lang="de-DE"/>
           </a:p>
@@ -1149,7 +1149,7 @@
           <a:p>
             <a:fld id="{67DA7FF3-27C9-B246-82E9-604608D4AEBB}" type="datetimeFigureOut">
               <a:rPr lang="de-DE" smtClean="0"/>
-              <a:t>14.04.19</a:t>
+              <a:t>15.04.19</a:t>
             </a:fld>
             <a:endParaRPr lang="de-DE"/>
           </a:p>
@@ -1203,7 +1203,7 @@
           <a:p>
             <a:fld id="{D7FD97AA-C347-C94D-B619-816BCDA6CB60}" type="slidenum">
               <a:rPr lang="de-DE" smtClean="0"/>
-              <a:t>‹Nr.›</a:t>
+              <a:t>‹#›</a:t>
             </a:fld>
             <a:endParaRPr lang="de-DE"/>
           </a:p>
@@ -1414,7 +1414,7 @@
           <a:p>
             <a:fld id="{67DA7FF3-27C9-B246-82E9-604608D4AEBB}" type="datetimeFigureOut">
               <a:rPr lang="de-DE" smtClean="0"/>
-              <a:t>14.04.19</a:t>
+              <a:t>15.04.19</a:t>
             </a:fld>
             <a:endParaRPr lang="de-DE"/>
           </a:p>
@@ -1468,7 +1468,7 @@
           <a:p>
             <a:fld id="{D7FD97AA-C347-C94D-B619-816BCDA6CB60}" type="slidenum">
               <a:rPr lang="de-DE" smtClean="0"/>
-              <a:t>‹Nr.›</a:t>
+              <a:t>‹#›</a:t>
             </a:fld>
             <a:endParaRPr lang="de-DE"/>
           </a:p>
@@ -1826,7 +1826,7 @@
           <a:p>
             <a:fld id="{67DA7FF3-27C9-B246-82E9-604608D4AEBB}" type="datetimeFigureOut">
               <a:rPr lang="de-DE" smtClean="0"/>
-              <a:t>14.04.19</a:t>
+              <a:t>15.04.19</a:t>
             </a:fld>
             <a:endParaRPr lang="de-DE"/>
           </a:p>
@@ -1880,7 +1880,7 @@
           <a:p>
             <a:fld id="{D7FD97AA-C347-C94D-B619-816BCDA6CB60}" type="slidenum">
               <a:rPr lang="de-DE" smtClean="0"/>
-              <a:t>‹Nr.›</a:t>
+              <a:t>‹#›</a:t>
             </a:fld>
             <a:endParaRPr lang="de-DE"/>
           </a:p>
@@ -1967,7 +1967,7 @@
           <a:p>
             <a:fld id="{67DA7FF3-27C9-B246-82E9-604608D4AEBB}" type="datetimeFigureOut">
               <a:rPr lang="de-DE" smtClean="0"/>
-              <a:t>14.04.19</a:t>
+              <a:t>15.04.19</a:t>
             </a:fld>
             <a:endParaRPr lang="de-DE"/>
           </a:p>
@@ -2021,7 +2021,7 @@
           <a:p>
             <a:fld id="{D7FD97AA-C347-C94D-B619-816BCDA6CB60}" type="slidenum">
               <a:rPr lang="de-DE" smtClean="0"/>
-              <a:t>‹Nr.›</a:t>
+              <a:t>‹#›</a:t>
             </a:fld>
             <a:endParaRPr lang="de-DE"/>
           </a:p>
@@ -2080,7 +2080,7 @@
           <a:p>
             <a:fld id="{67DA7FF3-27C9-B246-82E9-604608D4AEBB}" type="datetimeFigureOut">
               <a:rPr lang="de-DE" smtClean="0"/>
-              <a:t>14.04.19</a:t>
+              <a:t>15.04.19</a:t>
             </a:fld>
             <a:endParaRPr lang="de-DE"/>
           </a:p>
@@ -2134,7 +2134,7 @@
           <a:p>
             <a:fld id="{D7FD97AA-C347-C94D-B619-816BCDA6CB60}" type="slidenum">
               <a:rPr lang="de-DE" smtClean="0"/>
-              <a:t>‹Nr.›</a:t>
+              <a:t>‹#›</a:t>
             </a:fld>
             <a:endParaRPr lang="de-DE"/>
           </a:p>
@@ -2391,7 +2391,7 @@
           <a:p>
             <a:fld id="{67DA7FF3-27C9-B246-82E9-604608D4AEBB}" type="datetimeFigureOut">
               <a:rPr lang="de-DE" smtClean="0"/>
-              <a:t>14.04.19</a:t>
+              <a:t>15.04.19</a:t>
             </a:fld>
             <a:endParaRPr lang="de-DE"/>
           </a:p>
@@ -2445,7 +2445,7 @@
           <a:p>
             <a:fld id="{D7FD97AA-C347-C94D-B619-816BCDA6CB60}" type="slidenum">
               <a:rPr lang="de-DE" smtClean="0"/>
-              <a:t>‹Nr.›</a:t>
+              <a:t>‹#›</a:t>
             </a:fld>
             <a:endParaRPr lang="de-DE"/>
           </a:p>
@@ -2679,7 +2679,7 @@
           <a:p>
             <a:fld id="{67DA7FF3-27C9-B246-82E9-604608D4AEBB}" type="datetimeFigureOut">
               <a:rPr lang="de-DE" smtClean="0"/>
-              <a:t>14.04.19</a:t>
+              <a:t>15.04.19</a:t>
             </a:fld>
             <a:endParaRPr lang="de-DE"/>
           </a:p>
@@ -2733,7 +2733,7 @@
           <a:p>
             <a:fld id="{D7FD97AA-C347-C94D-B619-816BCDA6CB60}" type="slidenum">
               <a:rPr lang="de-DE" smtClean="0"/>
-              <a:t>‹Nr.›</a:t>
+              <a:t>‹#›</a:t>
             </a:fld>
             <a:endParaRPr lang="de-DE"/>
           </a:p>
@@ -2920,7 +2920,7 @@
           <a:p>
             <a:fld id="{67DA7FF3-27C9-B246-82E9-604608D4AEBB}" type="datetimeFigureOut">
               <a:rPr lang="de-DE" smtClean="0"/>
-              <a:t>14.04.19</a:t>
+              <a:t>15.04.19</a:t>
             </a:fld>
             <a:endParaRPr lang="de-DE"/>
           </a:p>
@@ -3010,7 +3010,7 @@
           <a:p>
             <a:fld id="{D7FD97AA-C347-C94D-B619-816BCDA6CB60}" type="slidenum">
               <a:rPr lang="de-DE" smtClean="0"/>
-              <a:t>‹Nr.›</a:t>
+              <a:t>‹#›</a:t>
             </a:fld>
             <a:endParaRPr lang="de-DE"/>
           </a:p>
@@ -3388,7 +3388,11 @@
           <a:lstStyle/>
           <a:p>
             <a:pPr algn="ctr"/>
-            <a:endParaRPr lang="de-DE" dirty="0"/>
+            <a:endParaRPr lang="de-DE" dirty="0">
+              <a:latin typeface="Helvetica Neue" panose="02000503000000020004" pitchFamily="2" charset="0"/>
+              <a:ea typeface="Helvetica Neue" panose="02000503000000020004" pitchFamily="2" charset="0"/>
+              <a:cs typeface="Helvetica Neue" panose="02000503000000020004" pitchFamily="2" charset="0"/>
+            </a:endParaRPr>
           </a:p>
         </p:txBody>
       </p:sp>
@@ -3445,7 +3449,11 @@
           <a:lstStyle/>
           <a:p>
             <a:pPr algn="ctr"/>
-            <a:endParaRPr lang="de-DE" sz="1000" dirty="0"/>
+            <a:endParaRPr lang="de-DE" sz="1000" dirty="0">
+              <a:latin typeface="Helvetica Neue" panose="02000503000000020004" pitchFamily="2" charset="0"/>
+              <a:ea typeface="Helvetica Neue" panose="02000503000000020004" pitchFamily="2" charset="0"/>
+              <a:cs typeface="Helvetica Neue" panose="02000503000000020004" pitchFamily="2" charset="0"/>
+            </a:endParaRPr>
           </a:p>
         </p:txBody>
       </p:sp>
@@ -3479,18 +3487,34 @@
           <a:p>
             <a:pPr algn="ctr"/>
             <a:r>
-              <a:rPr lang="de-DE" dirty="0" err="1"/>
+              <a:rPr lang="de-DE" dirty="0" err="1">
+                <a:latin typeface="Helvetica Neue" panose="02000503000000020004" pitchFamily="2" charset="0"/>
+                <a:ea typeface="Helvetica Neue" panose="02000503000000020004" pitchFamily="2" charset="0"/>
+                <a:cs typeface="Helvetica Neue" panose="02000503000000020004" pitchFamily="2" charset="0"/>
+              </a:rPr>
               <a:t>biosignalEMG</a:t>
             </a:r>
-            <a:endParaRPr lang="de-DE" sz="1600" dirty="0"/>
+            <a:endParaRPr lang="de-DE" sz="1600" dirty="0">
+              <a:latin typeface="Helvetica Neue" panose="02000503000000020004" pitchFamily="2" charset="0"/>
+              <a:ea typeface="Helvetica Neue" panose="02000503000000020004" pitchFamily="2" charset="0"/>
+              <a:cs typeface="Helvetica Neue" panose="02000503000000020004" pitchFamily="2" charset="0"/>
+            </a:endParaRPr>
           </a:p>
           <a:p>
             <a:pPr algn="ctr"/>
             <a:r>
-              <a:rPr lang="de-DE" dirty="0" err="1"/>
-              <a:t>Conversion</a:t>
-            </a:r>
-            <a:endParaRPr lang="de-DE" sz="1600" dirty="0"/>
+              <a:rPr lang="de-DE" dirty="0" err="1">
+                <a:latin typeface="Helvetica Neue" panose="02000503000000020004" pitchFamily="2" charset="0"/>
+                <a:ea typeface="Helvetica Neue" panose="02000503000000020004" pitchFamily="2" charset="0"/>
+                <a:cs typeface="Helvetica Neue" panose="02000503000000020004" pitchFamily="2" charset="0"/>
+              </a:rPr>
+              <a:t>Preprocessing</a:t>
+            </a:r>
+            <a:endParaRPr lang="de-DE" sz="1600" dirty="0">
+              <a:latin typeface="Helvetica Neue" panose="02000503000000020004" pitchFamily="2" charset="0"/>
+              <a:ea typeface="Helvetica Neue" panose="02000503000000020004" pitchFamily="2" charset="0"/>
+              <a:cs typeface="Helvetica Neue" panose="02000503000000020004" pitchFamily="2" charset="0"/>
+            </a:endParaRPr>
           </a:p>
         </p:txBody>
       </p:sp>
@@ -3547,7 +3571,11 @@
           <a:lstStyle/>
           <a:p>
             <a:pPr algn="ctr"/>
-            <a:endParaRPr lang="de-DE" sz="1000" dirty="0"/>
+            <a:endParaRPr lang="de-DE" sz="1000" dirty="0">
+              <a:latin typeface="Helvetica Neue" panose="02000503000000020004" pitchFamily="2" charset="0"/>
+              <a:ea typeface="Helvetica Neue" panose="02000503000000020004" pitchFamily="2" charset="0"/>
+              <a:cs typeface="Helvetica Neue" panose="02000503000000020004" pitchFamily="2" charset="0"/>
+            </a:endParaRPr>
           </a:p>
         </p:txBody>
       </p:sp>
@@ -3581,7 +3609,11 @@
           <a:p>
             <a:pPr algn="ctr"/>
             <a:r>
-              <a:rPr lang="de-DE" dirty="0"/>
+              <a:rPr lang="de-DE" dirty="0">
+                <a:latin typeface="Helvetica Neue" panose="02000503000000020004" pitchFamily="2" charset="0"/>
+                <a:ea typeface="Helvetica Neue" panose="02000503000000020004" pitchFamily="2" charset="0"/>
+                <a:cs typeface="Helvetica Neue" panose="02000503000000020004" pitchFamily="2" charset="0"/>
+              </a:rPr>
               <a:t>PCA</a:t>
             </a:r>
           </a:p>
@@ -3639,7 +3671,11 @@
           <a:lstStyle/>
           <a:p>
             <a:pPr algn="ctr"/>
-            <a:endParaRPr lang="de-DE"/>
+            <a:endParaRPr lang="de-DE">
+              <a:latin typeface="Helvetica Neue" panose="02000503000000020004" pitchFamily="2" charset="0"/>
+              <a:ea typeface="Helvetica Neue" panose="02000503000000020004" pitchFamily="2" charset="0"/>
+              <a:cs typeface="Helvetica Neue" panose="02000503000000020004" pitchFamily="2" charset="0"/>
+            </a:endParaRPr>
           </a:p>
         </p:txBody>
       </p:sp>
@@ -3695,7 +3731,11 @@
           <a:lstStyle/>
           <a:p>
             <a:pPr algn="ctr"/>
-            <a:endParaRPr lang="de-DE"/>
+            <a:endParaRPr lang="de-DE">
+              <a:latin typeface="Helvetica Neue" panose="02000503000000020004" pitchFamily="2" charset="0"/>
+              <a:ea typeface="Helvetica Neue" panose="02000503000000020004" pitchFamily="2" charset="0"/>
+              <a:cs typeface="Helvetica Neue" panose="02000503000000020004" pitchFamily="2" charset="0"/>
+            </a:endParaRPr>
           </a:p>
         </p:txBody>
       </p:sp>
@@ -3980,18 +4020,34 @@
           <a:p>
             <a:pPr algn="ctr"/>
             <a:r>
-              <a:rPr lang="de-DE" sz="1600" dirty="0" err="1"/>
+              <a:rPr lang="de-DE" sz="1600" dirty="0" err="1">
+                <a:latin typeface="Helvetica Neue" panose="02000503000000020004" pitchFamily="2" charset="0"/>
+                <a:ea typeface="Helvetica Neue" panose="02000503000000020004" pitchFamily="2" charset="0"/>
+                <a:cs typeface="Helvetica Neue" panose="02000503000000020004" pitchFamily="2" charset="0"/>
+              </a:rPr>
               <a:t>sEMG</a:t>
             </a:r>
             <a:r>
-              <a:rPr lang="de-DE" sz="1600" dirty="0"/>
+              <a:rPr lang="de-DE" sz="1600" dirty="0">
+                <a:latin typeface="Helvetica Neue" panose="02000503000000020004" pitchFamily="2" charset="0"/>
+                <a:ea typeface="Helvetica Neue" panose="02000503000000020004" pitchFamily="2" charset="0"/>
+                <a:cs typeface="Helvetica Neue" panose="02000503000000020004" pitchFamily="2" charset="0"/>
+              </a:rPr>
               <a:t> </a:t>
             </a:r>
             <a:r>
-              <a:rPr lang="de-DE" dirty="0"/>
+              <a:rPr lang="de-DE" dirty="0">
+                <a:latin typeface="Helvetica Neue" panose="02000503000000020004" pitchFamily="2" charset="0"/>
+                <a:ea typeface="Helvetica Neue" panose="02000503000000020004" pitchFamily="2" charset="0"/>
+                <a:cs typeface="Helvetica Neue" panose="02000503000000020004" pitchFamily="2" charset="0"/>
+              </a:rPr>
               <a:t>Data</a:t>
             </a:r>
-            <a:endParaRPr lang="de-DE" sz="1600" dirty="0"/>
+            <a:endParaRPr lang="de-DE" sz="1600" dirty="0">
+              <a:latin typeface="Helvetica Neue" panose="02000503000000020004" pitchFamily="2" charset="0"/>
+              <a:ea typeface="Helvetica Neue" panose="02000503000000020004" pitchFamily="2" charset="0"/>
+              <a:cs typeface="Helvetica Neue" panose="02000503000000020004" pitchFamily="2" charset="0"/>
+            </a:endParaRPr>
           </a:p>
         </p:txBody>
       </p:sp>
@@ -4139,8 +4195,8 @@
         </p:nvSpPr>
         <p:spPr>
           <a:xfrm>
-            <a:off x="8277442" y="3766817"/>
-            <a:ext cx="1152000" cy="369332"/>
+            <a:off x="8251373" y="3766817"/>
+            <a:ext cx="1232499" cy="369332"/>
           </a:xfrm>
           <a:prstGeom prst="rect">
             <a:avLst/>
@@ -4155,7 +4211,11 @@
           <a:p>
             <a:pPr algn="ctr"/>
             <a:r>
-              <a:rPr lang="de-DE" dirty="0"/>
+              <a:rPr lang="de-DE" dirty="0">
+                <a:latin typeface="Helvetica Neue" panose="02000503000000020004" pitchFamily="2" charset="0"/>
+                <a:ea typeface="Helvetica Neue" panose="02000503000000020004" pitchFamily="2" charset="0"/>
+                <a:cs typeface="Helvetica Neue" panose="02000503000000020004" pitchFamily="2" charset="0"/>
+              </a:rPr>
               <a:t>ANN 4 PC</a:t>
             </a:r>
           </a:p>
@@ -4175,8 +4235,8 @@
         </p:nvSpPr>
         <p:spPr>
           <a:xfrm>
-            <a:off x="8379615" y="1760244"/>
-            <a:ext cx="1152000" cy="369332"/>
+            <a:off x="8109857" y="1760244"/>
+            <a:ext cx="1589314" cy="646331"/>
           </a:xfrm>
           <a:prstGeom prst="rect">
             <a:avLst/>
@@ -4191,9 +4251,26 @@
           <a:p>
             <a:pPr algn="ctr"/>
             <a:r>
-              <a:rPr lang="de-DE" dirty="0"/>
-              <a:t>ANN 8 PC</a:t>
-            </a:r>
+              <a:rPr lang="de-DE" dirty="0">
+                <a:latin typeface="Helvetica Neue" panose="02000503000000020004" pitchFamily="2" charset="0"/>
+                <a:ea typeface="Helvetica Neue" panose="02000503000000020004" pitchFamily="2" charset="0"/>
+                <a:cs typeface="Helvetica Neue" panose="02000503000000020004" pitchFamily="2" charset="0"/>
+              </a:rPr>
+              <a:t>ANN all </a:t>
+            </a:r>
+            <a:r>
+              <a:rPr lang="de-DE" dirty="0" err="1">
+                <a:latin typeface="Helvetica Neue" panose="02000503000000020004" pitchFamily="2" charset="0"/>
+                <a:ea typeface="Helvetica Neue" panose="02000503000000020004" pitchFamily="2" charset="0"/>
+                <a:cs typeface="Helvetica Neue" panose="02000503000000020004" pitchFamily="2" charset="0"/>
+              </a:rPr>
+              <a:t>components</a:t>
+            </a:r>
+            <a:endParaRPr lang="de-DE" dirty="0">
+              <a:latin typeface="Helvetica Neue" panose="02000503000000020004" pitchFamily="2" charset="0"/>
+              <a:ea typeface="Helvetica Neue" panose="02000503000000020004" pitchFamily="2" charset="0"/>
+              <a:cs typeface="Helvetica Neue" panose="02000503000000020004" pitchFamily="2" charset="0"/>
+            </a:endParaRPr>
           </a:p>
         </p:txBody>
       </p:sp>

</xml_diff>